<commit_message>
add sources and resources
</commit_message>
<xml_diff>
--- a/DbaseTesting.pptx
+++ b/DbaseTesting.pptx
@@ -275,7 +275,7 @@
           <a:p>
             <a:fld id="{413C5D85-733F-4DA0-8937-915883061A50}" type="datetimeFigureOut">
               <a:rPr lang="en-US" smtClean="0"/>
-              <a:t>11/4/2022</a:t>
+              <a:t>11/5/2022</a:t>
             </a:fld>
             <a:endParaRPr lang="en-US" dirty="0"/>
           </a:p>
@@ -1251,43 +1251,7 @@
                 <a:effectLst/>
                 <a:latin typeface="-apple-system"/>
               </a:rPr>
-              <a:t>Мастер-данные - к таким бизнес-сущностям относятся клиенты, поставщики, продукция, услуги, договора, счета, пациенты, граждане и т.п. Кроме информации непосредственно о той или иной мастер-сущности, в мастер-данные входят взаимосвязи между этими сущностями и иерархии.</a:t>
-            </a:r>
-          </a:p>
-          <a:p>
-            <a:r>
-              <a:rPr lang="ru-RU" b="0" i="0" dirty="0">
-                <a:solidFill>
-                  <a:srgbClr val="111111"/>
-                </a:solidFill>
-                <a:effectLst/>
-                <a:latin typeface="-apple-system"/>
-              </a:rPr>
-              <a:t>Например, с точки зрения поиска дополнительных возможностей продаж, может быть очень важно выявлять явные и неявные взаимосвязи между физическими лицами.</a:t>
-            </a:r>
-          </a:p>
-          <a:p>
-            <a:r>
-              <a:rPr lang="ru-RU" b="0" i="0" dirty="0">
-                <a:solidFill>
-                  <a:srgbClr val="111111"/>
-                </a:solidFill>
-                <a:effectLst/>
-                <a:latin typeface="-apple-system"/>
-              </a:rPr>
-              <a:t>Мастер-данные распространяются по всему предприятию и участвуют во всех бизнес-процессах. </a:t>
-            </a:r>
-          </a:p>
-          <a:p>
-            <a:r>
-              <a:rPr lang="ru-RU" b="0" i="0" dirty="0">
-                <a:solidFill>
-                  <a:srgbClr val="111111"/>
-                </a:solidFill>
-                <a:effectLst/>
-                <a:latin typeface="-apple-system"/>
-              </a:rPr>
-              <a:t>Мастер-данные воспринимаются как ключевой нематериальный актив предприятия, т.к. от их качества и полноты зависит эффективность его работы. В России часто вместо термина «мастер-данные» используют термин «нормативно-справочная информация».</a:t>
+              <a:t>Мастер-данные - «нормативно-справочная информация».</a:t>
             </a:r>
             <a:endParaRPr lang="en-US" dirty="0"/>
           </a:p>
@@ -9574,7 +9538,7 @@
           <a:p>
             <a:fld id="{EC0DF3D3-6BDF-454E-BD7B-257CB6720A5E}" type="datetime11">
               <a:rPr lang="en-US" smtClean="0"/>
-              <a:t>13:48:16</a:t>
+              <a:t>11:33:55</a:t>
             </a:fld>
             <a:endParaRPr lang="en-US" dirty="0"/>
           </a:p>
@@ -9772,7 +9736,7 @@
           <a:p>
             <a:fld id="{E5B678C6-0BA8-421F-921F-6B65E458163B}" type="datetime11">
               <a:rPr lang="en-US" smtClean="0"/>
-              <a:t>13:48:17</a:t>
+              <a:t>11:33:55</a:t>
             </a:fld>
             <a:endParaRPr lang="en-US" dirty="0"/>
           </a:p>
@@ -9980,7 +9944,7 @@
           <a:p>
             <a:fld id="{26C62F2E-527A-4D85-840E-1C3C7A3548DF}" type="datetime11">
               <a:rPr lang="en-US" smtClean="0"/>
-              <a:t>13:48:17</a:t>
+              <a:t>11:33:55</a:t>
             </a:fld>
             <a:endParaRPr lang="en-US" dirty="0"/>
           </a:p>
@@ -10191,7 +10155,7 @@
           <a:p>
             <a:fld id="{C6F9D492-1E6E-4290-89AF-43CFA1B9B110}" type="datetime11">
               <a:rPr lang="en-US" smtClean="0"/>
-              <a:t>13:48:17</a:t>
+              <a:t>11:33:55</a:t>
             </a:fld>
             <a:endParaRPr lang="en-US" dirty="0"/>
           </a:p>
@@ -10474,7 +10438,7 @@
           <a:p>
             <a:fld id="{CF29D22A-5489-402B-8C10-5D36CDCE1601}" type="datetime11">
               <a:rPr lang="en-US" smtClean="0"/>
-              <a:t>13:48:17</a:t>
+              <a:t>11:33:55</a:t>
             </a:fld>
             <a:endParaRPr lang="en-US" dirty="0"/>
           </a:p>
@@ -10739,7 +10703,7 @@
           <a:p>
             <a:fld id="{9AC4480C-5A02-454D-BB93-3497C9306AA9}" type="datetime11">
               <a:rPr lang="en-US" smtClean="0"/>
-              <a:t>13:48:17</a:t>
+              <a:t>11:33:55</a:t>
             </a:fld>
             <a:endParaRPr lang="en-US" dirty="0"/>
           </a:p>
@@ -11151,7 +11115,7 @@
           <a:p>
             <a:fld id="{45E661A6-E59E-4374-8D4F-B5A3D29A3452}" type="datetime11">
               <a:rPr lang="en-US" smtClean="0"/>
-              <a:t>13:48:17</a:t>
+              <a:t>11:33:55</a:t>
             </a:fld>
             <a:endParaRPr lang="en-US" dirty="0"/>
           </a:p>
@@ -11292,7 +11256,7 @@
           <a:p>
             <a:fld id="{A7E1DF95-5940-4137-9592-ABF9491B1D54}" type="datetime11">
               <a:rPr lang="en-US" smtClean="0"/>
-              <a:t>13:48:17</a:t>
+              <a:t>11:33:55</a:t>
             </a:fld>
             <a:endParaRPr lang="en-US" dirty="0"/>
           </a:p>
@@ -11405,7 +11369,7 @@
           <a:p>
             <a:fld id="{0C393338-0247-4DAF-B748-75C9C9CEBADA}" type="datetime11">
               <a:rPr lang="en-US" smtClean="0"/>
-              <a:t>13:48:17</a:t>
+              <a:t>11:33:55</a:t>
             </a:fld>
             <a:endParaRPr lang="en-US" dirty="0"/>
           </a:p>
@@ -11716,7 +11680,7 @@
           <a:p>
             <a:fld id="{D805FC4B-CBC6-4D81-880D-A0BE66ACADEB}" type="datetime11">
               <a:rPr lang="en-US" smtClean="0"/>
-              <a:t>13:48:17</a:t>
+              <a:t>11:33:55</a:t>
             </a:fld>
             <a:endParaRPr lang="en-US" dirty="0"/>
           </a:p>
@@ -12004,7 +11968,7 @@
           <a:p>
             <a:fld id="{A78DC593-E03F-4BC7-954A-271DE9AF240C}" type="datetime11">
               <a:rPr lang="en-US" smtClean="0"/>
-              <a:t>13:48:17</a:t>
+              <a:t>11:33:55</a:t>
             </a:fld>
             <a:endParaRPr lang="en-US" dirty="0"/>
           </a:p>
@@ -12254,7 +12218,7 @@
           <a:p>
             <a:fld id="{C05C4BE0-CE6D-4AEB-9CE4-D6250A65E8BB}" type="datetime11">
               <a:rPr lang="en-US" smtClean="0"/>
-              <a:t>13:48:16</a:t>
+              <a:t>11:33:55</a:t>
             </a:fld>
             <a:endParaRPr lang="en-US" dirty="0"/>
           </a:p>
@@ -21003,7 +20967,14 @@
                 <a:latin typeface="Segoe UI" panose="020B0502040204020203" pitchFamily="34" charset="0"/>
                 <a:cs typeface="Segoe UI" panose="020B0502040204020203" pitchFamily="34" charset="0"/>
               </a:rPr>
-              <a:t>Управляемые зависимости   </a:t>
+              <a:t>Управляемые зависимости</a:t>
+            </a:r>
+            <a:r>
+              <a:rPr lang="en-US" b="1" dirty="0">
+                <a:latin typeface="Segoe UI" panose="020B0502040204020203" pitchFamily="34" charset="0"/>
+                <a:cs typeface="Segoe UI" panose="020B0502040204020203" pitchFamily="34" charset="0"/>
+              </a:rPr>
+              <a:t> </a:t>
             </a:r>
             <a:r>
               <a:rPr lang="en-US" dirty="0">
@@ -21013,11 +20984,32 @@
               <a:t>- </a:t>
             </a:r>
             <a:r>
+              <a:rPr lang="ru-RU" dirty="0" err="1">
+                <a:latin typeface="Segoe UI" panose="020B0502040204020203" pitchFamily="34" charset="0"/>
+                <a:cs typeface="Segoe UI" panose="020B0502040204020203" pitchFamily="34" charset="0"/>
+              </a:rPr>
+              <a:t>внепроцессные</a:t>
+            </a:r>
+            <a:r>
               <a:rPr lang="ru-RU" dirty="0">
                 <a:latin typeface="Segoe UI" panose="020B0502040204020203" pitchFamily="34" charset="0"/>
                 <a:cs typeface="Segoe UI" panose="020B0502040204020203" pitchFamily="34" charset="0"/>
               </a:rPr>
-              <a:t>  внепроцессные зависимости, над которыми мы имеем полный контроль.</a:t>
+              <a:t> зависимости,</a:t>
+            </a:r>
+            <a:r>
+              <a:rPr lang="en-US" dirty="0">
+                <a:latin typeface="Segoe UI" panose="020B0502040204020203" pitchFamily="34" charset="0"/>
+                <a:cs typeface="Segoe UI" panose="020B0502040204020203" pitchFamily="34" charset="0"/>
+              </a:rPr>
+              <a:t> </a:t>
+            </a:r>
+            <a:r>
+              <a:rPr lang="ru-RU" dirty="0">
+                <a:latin typeface="Segoe UI" panose="020B0502040204020203" pitchFamily="34" charset="0"/>
+                <a:cs typeface="Segoe UI" panose="020B0502040204020203" pitchFamily="34" charset="0"/>
+              </a:rPr>
+              <a:t>над которыми мы имеем полный контроль.</a:t>
             </a:r>
           </a:p>
           <a:p>
@@ -28549,7 +28541,7 @@
         </p:blipFill>
         <p:spPr>
           <a:xfrm>
-            <a:off x="2814773" y="156887"/>
+            <a:off x="2825056" y="158615"/>
             <a:ext cx="3558785" cy="6187280"/>
           </a:xfrm>
           <a:prstGeom prst="rect">
@@ -28631,78 +28623,6 @@
                                     <p:set>
                                       <p:cBhvr>
                                         <p:cTn id="6" dur="1" fill="hold">
-                                          <p:stCondLst>
-                                            <p:cond delay="0"/>
-                                          </p:stCondLst>
-                                        </p:cTn>
-                                        <p:tgtEl>
-                                          <p:spTgt spid="3"/>
-                                        </p:tgtEl>
-                                        <p:attrNameLst>
-                                          <p:attrName>style.visibility</p:attrName>
-                                        </p:attrNameLst>
-                                      </p:cBhvr>
-                                      <p:to>
-                                        <p:strVal val="visible"/>
-                                      </p:to>
-                                    </p:set>
-                                  </p:childTnLst>
-                                </p:cTn>
-                              </p:par>
-                              <p:par>
-                                <p:cTn id="7" presetID="1" presetClass="entr" presetSubtype="0" fill="hold" nodeType="withEffect">
-                                  <p:stCondLst>
-                                    <p:cond delay="0"/>
-                                  </p:stCondLst>
-                                  <p:childTnLst>
-                                    <p:set>
-                                      <p:cBhvr>
-                                        <p:cTn id="8" dur="1" fill="hold">
-                                          <p:stCondLst>
-                                            <p:cond delay="0"/>
-                                          </p:stCondLst>
-                                        </p:cTn>
-                                        <p:tgtEl>
-                                          <p:spTgt spid="7"/>
-                                        </p:tgtEl>
-                                        <p:attrNameLst>
-                                          <p:attrName>style.visibility</p:attrName>
-                                        </p:attrNameLst>
-                                      </p:cBhvr>
-                                      <p:to>
-                                        <p:strVal val="visible"/>
-                                      </p:to>
-                                    </p:set>
-                                  </p:childTnLst>
-                                </p:cTn>
-                              </p:par>
-                            </p:childTnLst>
-                          </p:cTn>
-                        </p:par>
-                      </p:childTnLst>
-                    </p:cTn>
-                  </p:par>
-                  <p:par>
-                    <p:cTn id="9" fill="hold">
-                      <p:stCondLst>
-                        <p:cond delay="indefinite"/>
-                      </p:stCondLst>
-                      <p:childTnLst>
-                        <p:par>
-                          <p:cTn id="10" fill="hold">
-                            <p:stCondLst>
-                              <p:cond delay="0"/>
-                            </p:stCondLst>
-                            <p:childTnLst>
-                              <p:par>
-                                <p:cTn id="11" presetID="1" presetClass="entr" presetSubtype="0" fill="hold" nodeType="clickEffect">
-                                  <p:stCondLst>
-                                    <p:cond delay="0"/>
-                                  </p:stCondLst>
-                                  <p:childTnLst>
-                                    <p:set>
-                                      <p:cBhvr>
-                                        <p:cTn id="12" dur="1" fill="hold">
                                           <p:stCondLst>
                                             <p:cond delay="0"/>
                                           </p:stCondLst>

</xml_diff>